<commit_message>
Add testReport in ADReport
</commit_message>
<xml_diff>
--- a/Adventure Design.pptx
+++ b/Adventure Design.pptx
@@ -21,6 +21,7 @@
     <p:sldId id="276" r:id="rId15"/>
     <p:sldId id="277" r:id="rId16"/>
     <p:sldId id="278" r:id="rId17"/>
+    <p:sldId id="282" r:id="rId18"/>
   </p:sldIdLst>
   <p:sldSz cx="12192000" cy="6858000"/>
   <p:notesSz cx="6858000" cy="9144000"/>
@@ -274,7 +275,7 @@
           <a:p>
             <a:fld id="{1073FD90-5537-4366-A61B-260BD41BA947}" type="datetimeFigureOut">
               <a:rPr lang="ko-KR" altLang="en-US" smtClean="0"/>
-              <a:t>2018-12-10</a:t>
+              <a:t>2018-12-11</a:t>
             </a:fld>
             <a:endParaRPr lang="ko-KR" altLang="en-US"/>
           </a:p>
@@ -472,7 +473,7 @@
           <a:p>
             <a:fld id="{1073FD90-5537-4366-A61B-260BD41BA947}" type="datetimeFigureOut">
               <a:rPr lang="ko-KR" altLang="en-US" smtClean="0"/>
-              <a:t>2018-12-10</a:t>
+              <a:t>2018-12-11</a:t>
             </a:fld>
             <a:endParaRPr lang="ko-KR" altLang="en-US"/>
           </a:p>
@@ -680,7 +681,7 @@
           <a:p>
             <a:fld id="{1073FD90-5537-4366-A61B-260BD41BA947}" type="datetimeFigureOut">
               <a:rPr lang="ko-KR" altLang="en-US" smtClean="0"/>
-              <a:t>2018-12-10</a:t>
+              <a:t>2018-12-11</a:t>
             </a:fld>
             <a:endParaRPr lang="ko-KR" altLang="en-US"/>
           </a:p>
@@ -878,7 +879,7 @@
           <a:p>
             <a:fld id="{1073FD90-5537-4366-A61B-260BD41BA947}" type="datetimeFigureOut">
               <a:rPr lang="ko-KR" altLang="en-US" smtClean="0"/>
-              <a:t>2018-12-10</a:t>
+              <a:t>2018-12-11</a:t>
             </a:fld>
             <a:endParaRPr lang="ko-KR" altLang="en-US"/>
           </a:p>
@@ -1153,7 +1154,7 @@
           <a:p>
             <a:fld id="{1073FD90-5537-4366-A61B-260BD41BA947}" type="datetimeFigureOut">
               <a:rPr lang="ko-KR" altLang="en-US" smtClean="0"/>
-              <a:t>2018-12-10</a:t>
+              <a:t>2018-12-11</a:t>
             </a:fld>
             <a:endParaRPr lang="ko-KR" altLang="en-US"/>
           </a:p>
@@ -1418,7 +1419,7 @@
           <a:p>
             <a:fld id="{1073FD90-5537-4366-A61B-260BD41BA947}" type="datetimeFigureOut">
               <a:rPr lang="ko-KR" altLang="en-US" smtClean="0"/>
-              <a:t>2018-12-10</a:t>
+              <a:t>2018-12-11</a:t>
             </a:fld>
             <a:endParaRPr lang="ko-KR" altLang="en-US"/>
           </a:p>
@@ -1830,7 +1831,7 @@
           <a:p>
             <a:fld id="{1073FD90-5537-4366-A61B-260BD41BA947}" type="datetimeFigureOut">
               <a:rPr lang="ko-KR" altLang="en-US" smtClean="0"/>
-              <a:t>2018-12-10</a:t>
+              <a:t>2018-12-11</a:t>
             </a:fld>
             <a:endParaRPr lang="ko-KR" altLang="en-US"/>
           </a:p>
@@ -1971,7 +1972,7 @@
           <a:p>
             <a:fld id="{1073FD90-5537-4366-A61B-260BD41BA947}" type="datetimeFigureOut">
               <a:rPr lang="ko-KR" altLang="en-US" smtClean="0"/>
-              <a:t>2018-12-10</a:t>
+              <a:t>2018-12-11</a:t>
             </a:fld>
             <a:endParaRPr lang="ko-KR" altLang="en-US"/>
           </a:p>
@@ -2084,7 +2085,7 @@
           <a:p>
             <a:fld id="{1073FD90-5537-4366-A61B-260BD41BA947}" type="datetimeFigureOut">
               <a:rPr lang="ko-KR" altLang="en-US" smtClean="0"/>
-              <a:t>2018-12-10</a:t>
+              <a:t>2018-12-11</a:t>
             </a:fld>
             <a:endParaRPr lang="ko-KR" altLang="en-US"/>
           </a:p>
@@ -2395,7 +2396,7 @@
           <a:p>
             <a:fld id="{1073FD90-5537-4366-A61B-260BD41BA947}" type="datetimeFigureOut">
               <a:rPr lang="ko-KR" altLang="en-US" smtClean="0"/>
-              <a:t>2018-12-10</a:t>
+              <a:t>2018-12-11</a:t>
             </a:fld>
             <a:endParaRPr lang="ko-KR" altLang="en-US"/>
           </a:p>
@@ -2683,7 +2684,7 @@
           <a:p>
             <a:fld id="{1073FD90-5537-4366-A61B-260BD41BA947}" type="datetimeFigureOut">
               <a:rPr lang="ko-KR" altLang="en-US" smtClean="0"/>
-              <a:t>2018-12-10</a:t>
+              <a:t>2018-12-11</a:t>
             </a:fld>
             <a:endParaRPr lang="ko-KR" altLang="en-US"/>
           </a:p>
@@ -2924,7 +2925,7 @@
           <a:p>
             <a:fld id="{1073FD90-5537-4366-A61B-260BD41BA947}" type="datetimeFigureOut">
               <a:rPr lang="ko-KR" altLang="en-US" smtClean="0"/>
-              <a:t>2018-12-10</a:t>
+              <a:t>2018-12-11</a:t>
             </a:fld>
             <a:endParaRPr lang="ko-KR" altLang="en-US"/>
           </a:p>
@@ -13641,6 +13642,1168 @@
 </p:sld>
 </file>
 
+<file path=ppt/slides/slide17.xml><?xml version="1.0" encoding="utf-8"?>
+<p:sld xmlns:a="http://schemas.openxmlformats.org/drawingml/2006/main" xmlns:r="http://schemas.openxmlformats.org/officeDocument/2006/relationships" xmlns:p="http://schemas.openxmlformats.org/presentationml/2006/main">
+  <p:cSld>
+    <p:spTree>
+      <p:nvGrpSpPr>
+        <p:cNvPr id="1" name=""/>
+        <p:cNvGrpSpPr/>
+        <p:nvPr/>
+      </p:nvGrpSpPr>
+      <p:grpSpPr>
+        <a:xfrm>
+          <a:off x="0" y="0"/>
+          <a:ext cx="0" cy="0"/>
+          <a:chOff x="0" y="0"/>
+          <a:chExt cx="0" cy="0"/>
+        </a:xfrm>
+      </p:grpSpPr>
+      <p:sp>
+        <p:nvSpPr>
+          <p:cNvPr id="2" name="제목 1">
+            <a:extLst>
+              <a:ext uri="{FF2B5EF4-FFF2-40B4-BE49-F238E27FC236}">
+                <a16:creationId xmlns:a16="http://schemas.microsoft.com/office/drawing/2014/main" id="{33DFDBA8-2FFE-45A9-98D4-B9671D5C5D40}"/>
+              </a:ext>
+            </a:extLst>
+          </p:cNvPr>
+          <p:cNvSpPr>
+            <a:spLocks noGrp="1"/>
+          </p:cNvSpPr>
+          <p:nvPr>
+            <p:ph type="title"/>
+          </p:nvPr>
+        </p:nvSpPr>
+        <p:spPr/>
+        <p:txBody>
+          <a:bodyPr/>
+          <a:lstStyle/>
+          <a:p>
+            <a:r>
+              <a:rPr lang="ko-KR" altLang="en-US" b="1" dirty="0">
+                <a:effectLst>
+                  <a:outerShdw blurRad="38100" dist="38100" dir="2700000" algn="tl">
+                    <a:srgbClr val="000000">
+                      <a:alpha val="43137"/>
+                    </a:srgbClr>
+                  </a:outerShdw>
+                </a:effectLst>
+              </a:rPr>
+              <a:t>테스트 보고서</a:t>
+            </a:r>
+          </a:p>
+        </p:txBody>
+      </p:sp>
+      <p:cxnSp>
+        <p:nvCxnSpPr>
+          <p:cNvPr id="5" name="직선 연결선 4">
+            <a:extLst>
+              <a:ext uri="{FF2B5EF4-FFF2-40B4-BE49-F238E27FC236}">
+                <a16:creationId xmlns:a16="http://schemas.microsoft.com/office/drawing/2014/main" id="{F22AA8DD-ED0F-45F1-86B0-9537AE71DA68}"/>
+              </a:ext>
+            </a:extLst>
+          </p:cNvPr>
+          <p:cNvCxnSpPr>
+            <a:cxnSpLocks/>
+          </p:cNvCxnSpPr>
+          <p:nvPr/>
+        </p:nvCxnSpPr>
+        <p:spPr>
+          <a:xfrm>
+            <a:off x="11084767" y="734457"/>
+            <a:ext cx="269033" cy="0"/>
+          </a:xfrm>
+          <a:prstGeom prst="line">
+            <a:avLst/>
+          </a:prstGeom>
+          <a:ln w="44450" cap="rnd">
+            <a:round/>
+          </a:ln>
+        </p:spPr>
+        <p:style>
+          <a:lnRef idx="1">
+            <a:schemeClr val="accent1"/>
+          </a:lnRef>
+          <a:fillRef idx="0">
+            <a:schemeClr val="accent1"/>
+          </a:fillRef>
+          <a:effectRef idx="0">
+            <a:schemeClr val="accent1"/>
+          </a:effectRef>
+          <a:fontRef idx="minor">
+            <a:schemeClr val="tx1"/>
+          </a:fontRef>
+        </p:style>
+      </p:cxnSp>
+      <p:cxnSp>
+        <p:nvCxnSpPr>
+          <p:cNvPr id="7" name="직선 연결선 6">
+            <a:extLst>
+              <a:ext uri="{FF2B5EF4-FFF2-40B4-BE49-F238E27FC236}">
+                <a16:creationId xmlns:a16="http://schemas.microsoft.com/office/drawing/2014/main" id="{F9208F28-276D-406F-A6EC-CFE994BD16F9}"/>
+              </a:ext>
+            </a:extLst>
+          </p:cNvPr>
+          <p:cNvCxnSpPr>
+            <a:cxnSpLocks/>
+          </p:cNvCxnSpPr>
+          <p:nvPr/>
+        </p:nvCxnSpPr>
+        <p:spPr>
+          <a:xfrm>
+            <a:off x="1006151" y="1375692"/>
+            <a:ext cx="234820" cy="0"/>
+          </a:xfrm>
+          <a:prstGeom prst="line">
+            <a:avLst/>
+          </a:prstGeom>
+          <a:ln w="44450" cap="rnd">
+            <a:round/>
+          </a:ln>
+        </p:spPr>
+        <p:style>
+          <a:lnRef idx="1">
+            <a:schemeClr val="accent1"/>
+          </a:lnRef>
+          <a:fillRef idx="0">
+            <a:schemeClr val="accent1"/>
+          </a:fillRef>
+          <a:effectRef idx="0">
+            <a:schemeClr val="accent1"/>
+          </a:effectRef>
+          <a:fontRef idx="minor">
+            <a:schemeClr val="tx1"/>
+          </a:fontRef>
+        </p:style>
+      </p:cxnSp>
+      <p:sp>
+        <p:nvSpPr>
+          <p:cNvPr id="9" name="TextBox 8">
+            <a:extLst>
+              <a:ext uri="{FF2B5EF4-FFF2-40B4-BE49-F238E27FC236}">
+                <a16:creationId xmlns:a16="http://schemas.microsoft.com/office/drawing/2014/main" id="{224FA63F-25E4-4A1B-8A7C-FEC4BFF243CB}"/>
+              </a:ext>
+            </a:extLst>
+          </p:cNvPr>
+          <p:cNvSpPr txBox="1"/>
+          <p:nvPr/>
+        </p:nvSpPr>
+        <p:spPr>
+          <a:xfrm>
+            <a:off x="9806473" y="365125"/>
+            <a:ext cx="1687286" cy="338554"/>
+          </a:xfrm>
+          <a:prstGeom prst="rect">
+            <a:avLst/>
+          </a:prstGeom>
+          <a:noFill/>
+        </p:spPr>
+        <p:txBody>
+          <a:bodyPr wrap="square" rtlCol="0">
+            <a:spAutoFit/>
+          </a:bodyPr>
+          <a:lstStyle/>
+          <a:p>
+            <a:pPr algn="r"/>
+            <a:r>
+              <a:rPr lang="ko-KR" altLang="en-US" sz="1600" b="1" dirty="0"/>
+              <a:t>테스트 보고서</a:t>
+            </a:r>
+          </a:p>
+        </p:txBody>
+      </p:sp>
+      <p:graphicFrame>
+        <p:nvGraphicFramePr>
+          <p:cNvPr id="6" name="표 5">
+            <a:extLst>
+              <a:ext uri="{FF2B5EF4-FFF2-40B4-BE49-F238E27FC236}">
+                <a16:creationId xmlns:a16="http://schemas.microsoft.com/office/drawing/2014/main" id="{BD6008F3-D65D-408F-89C3-B7D1F5441617}"/>
+              </a:ext>
+            </a:extLst>
+          </p:cNvPr>
+          <p:cNvGraphicFramePr>
+            <a:graphicFrameLocks noGrp="1"/>
+          </p:cNvGraphicFramePr>
+          <p:nvPr>
+            <p:extLst>
+              <p:ext uri="{D42A27DB-BD31-4B8C-83A1-F6EECF244321}">
+                <p14:modId xmlns:p14="http://schemas.microsoft.com/office/powerpoint/2010/main" val="3705304926"/>
+              </p:ext>
+            </p:extLst>
+          </p:nvPr>
+        </p:nvGraphicFramePr>
+        <p:xfrm>
+          <a:off x="838200" y="2701255"/>
+          <a:ext cx="10232571" cy="2448160"/>
+        </p:xfrm>
+        <a:graphic>
+          <a:graphicData uri="http://schemas.openxmlformats.org/drawingml/2006/table">
+            <a:tbl>
+              <a:tblPr firstRow="1" firstCol="1" bandRow="1">
+                <a:tableStyleId>{5C22544A-7EE6-4342-B048-85BDC9FD1C3A}</a:tableStyleId>
+              </a:tblPr>
+              <a:tblGrid>
+                <a:gridCol w="2344700">
+                  <a:extLst>
+                    <a:ext uri="{9D8B030D-6E8A-4147-A177-3AD203B41FA5}">
+                      <a16:colId xmlns:a16="http://schemas.microsoft.com/office/drawing/2014/main" val="4284368180"/>
+                    </a:ext>
+                  </a:extLst>
+                </a:gridCol>
+                <a:gridCol w="3452558">
+                  <a:extLst>
+                    <a:ext uri="{9D8B030D-6E8A-4147-A177-3AD203B41FA5}">
+                      <a16:colId xmlns:a16="http://schemas.microsoft.com/office/drawing/2014/main" val="1494425247"/>
+                    </a:ext>
+                  </a:extLst>
+                </a:gridCol>
+                <a:gridCol w="3296652">
+                  <a:extLst>
+                    <a:ext uri="{9D8B030D-6E8A-4147-A177-3AD203B41FA5}">
+                      <a16:colId xmlns:a16="http://schemas.microsoft.com/office/drawing/2014/main" val="1234071025"/>
+                    </a:ext>
+                  </a:extLst>
+                </a:gridCol>
+                <a:gridCol w="1138661">
+                  <a:extLst>
+                    <a:ext uri="{9D8B030D-6E8A-4147-A177-3AD203B41FA5}">
+                      <a16:colId xmlns:a16="http://schemas.microsoft.com/office/drawing/2014/main" val="2373352199"/>
+                    </a:ext>
+                  </a:extLst>
+                </a:gridCol>
+              </a:tblGrid>
+              <a:tr h="306020">
+                <a:tc>
+                  <a:txBody>
+                    <a:bodyPr/>
+                    <a:lstStyle/>
+                    <a:p>
+                      <a:pPr algn="ctr" latinLnBrk="1"/>
+                      <a:r>
+                        <a:rPr lang="en-US" altLang="ko-KR" sz="1200" b="1" dirty="0">
+                          <a:solidFill>
+                            <a:schemeClr val="bg1"/>
+                          </a:solidFill>
+                        </a:rPr>
+                        <a:t>Test Case</a:t>
+                      </a:r>
+                      <a:endParaRPr lang="ko-KR" altLang="en-US" sz="1200" b="1" dirty="0">
+                        <a:solidFill>
+                          <a:schemeClr val="bg1"/>
+                        </a:solidFill>
+                      </a:endParaRPr>
+                    </a:p>
+                  </a:txBody>
+                  <a:tcPr marL="72000" anchor="ctr">
+                    <a:solidFill>
+                      <a:schemeClr val="tx2"/>
+                    </a:solidFill>
+                  </a:tcPr>
+                </a:tc>
+                <a:tc>
+                  <a:txBody>
+                    <a:bodyPr/>
+                    <a:lstStyle/>
+                    <a:p>
+                      <a:pPr marL="0" marR="0" lvl="0" indent="0" algn="ctr" defTabSz="914400" rtl="0" eaLnBrk="1" fontAlgn="auto" latinLnBrk="1" hangingPunct="1">
+                        <a:lnSpc>
+                          <a:spcPct val="100000"/>
+                        </a:lnSpc>
+                        <a:spcBef>
+                          <a:spcPts val="0"/>
+                        </a:spcBef>
+                        <a:spcAft>
+                          <a:spcPts val="0"/>
+                        </a:spcAft>
+                        <a:buClrTx/>
+                        <a:buSzTx/>
+                        <a:buFontTx/>
+                        <a:buNone/>
+                        <a:tabLst/>
+                        <a:defRPr/>
+                      </a:pPr>
+                      <a:r>
+                        <a:rPr kumimoji="0" lang="en-US" altLang="ko-KR" sz="1200" b="1" i="0" u="none" strike="noStrike" kern="1200" cap="none" spc="0" normalizeH="0" baseline="0" noProof="0" dirty="0">
+                          <a:ln>
+                            <a:noFill/>
+                          </a:ln>
+                          <a:solidFill>
+                            <a:schemeClr val="bg1"/>
+                          </a:solidFill>
+                          <a:effectLst/>
+                          <a:uLnTx/>
+                          <a:uFillTx/>
+                          <a:latin typeface="+mn-lt"/>
+                          <a:ea typeface="+mn-ea"/>
+                          <a:cs typeface="+mn-cs"/>
+                        </a:rPr>
+                        <a:t>UUT(Unit Under Test)</a:t>
+                      </a:r>
+                      <a:endParaRPr kumimoji="0" lang="ko-KR" altLang="en-US" sz="1200" b="1" i="0" u="none" strike="noStrike" kern="1200" cap="none" spc="0" normalizeH="0" baseline="0" noProof="0" dirty="0">
+                        <a:ln>
+                          <a:noFill/>
+                        </a:ln>
+                        <a:solidFill>
+                          <a:schemeClr val="bg1"/>
+                        </a:solidFill>
+                        <a:effectLst/>
+                        <a:uLnTx/>
+                        <a:uFillTx/>
+                        <a:latin typeface="+mn-lt"/>
+                        <a:ea typeface="+mn-ea"/>
+                        <a:cs typeface="+mn-cs"/>
+                      </a:endParaRPr>
+                    </a:p>
+                  </a:txBody>
+                  <a:tcPr marL="72000" anchor="ctr">
+                    <a:solidFill>
+                      <a:schemeClr val="tx2"/>
+                    </a:solidFill>
+                  </a:tcPr>
+                </a:tc>
+                <a:tc>
+                  <a:txBody>
+                    <a:bodyPr/>
+                    <a:lstStyle/>
+                    <a:p>
+                      <a:pPr marL="0" marR="0" lvl="0" indent="0" algn="ctr" defTabSz="914400" rtl="0" eaLnBrk="1" fontAlgn="auto" latinLnBrk="1" hangingPunct="1">
+                        <a:lnSpc>
+                          <a:spcPct val="100000"/>
+                        </a:lnSpc>
+                        <a:spcBef>
+                          <a:spcPts val="0"/>
+                        </a:spcBef>
+                        <a:spcAft>
+                          <a:spcPts val="0"/>
+                        </a:spcAft>
+                        <a:buClrTx/>
+                        <a:buSzTx/>
+                        <a:buFontTx/>
+                        <a:buNone/>
+                        <a:tabLst/>
+                        <a:defRPr/>
+                      </a:pPr>
+                      <a:r>
+                        <a:rPr kumimoji="0" lang="en-US" altLang="ko-KR" sz="1200" b="1" i="0" u="none" strike="noStrike" kern="1200" cap="none" spc="0" normalizeH="0" baseline="0" noProof="0" dirty="0">
+                          <a:ln>
+                            <a:noFill/>
+                          </a:ln>
+                          <a:solidFill>
+                            <a:schemeClr val="bg1"/>
+                          </a:solidFill>
+                          <a:effectLst/>
+                          <a:uLnTx/>
+                          <a:uFillTx/>
+                          <a:latin typeface="+mn-lt"/>
+                          <a:ea typeface="+mn-ea"/>
+                          <a:cs typeface="+mn-cs"/>
+                        </a:rPr>
+                        <a:t>Description</a:t>
+                      </a:r>
+                      <a:endParaRPr kumimoji="0" lang="ko-KR" altLang="en-US" sz="1200" b="1" i="0" u="none" strike="noStrike" kern="1200" cap="none" spc="0" normalizeH="0" baseline="0" noProof="0" dirty="0">
+                        <a:ln>
+                          <a:noFill/>
+                        </a:ln>
+                        <a:solidFill>
+                          <a:schemeClr val="bg1"/>
+                        </a:solidFill>
+                        <a:effectLst/>
+                        <a:uLnTx/>
+                        <a:uFillTx/>
+                        <a:latin typeface="+mn-lt"/>
+                        <a:ea typeface="+mn-ea"/>
+                        <a:cs typeface="+mn-cs"/>
+                      </a:endParaRPr>
+                    </a:p>
+                  </a:txBody>
+                  <a:tcPr marL="72000" anchor="ctr">
+                    <a:solidFill>
+                      <a:schemeClr val="tx2"/>
+                    </a:solidFill>
+                  </a:tcPr>
+                </a:tc>
+                <a:tc>
+                  <a:txBody>
+                    <a:bodyPr/>
+                    <a:lstStyle/>
+                    <a:p>
+                      <a:pPr algn="ctr" latinLnBrk="1"/>
+                      <a:r>
+                        <a:rPr lang="en-US" altLang="ko-KR" sz="1200" b="1" dirty="0">
+                          <a:solidFill>
+                            <a:schemeClr val="bg1"/>
+                          </a:solidFill>
+                        </a:rPr>
+                        <a:t>Result</a:t>
+                      </a:r>
+                      <a:endParaRPr lang="ko-KR" altLang="en-US" sz="1200" b="1" dirty="0">
+                        <a:solidFill>
+                          <a:schemeClr val="bg1"/>
+                        </a:solidFill>
+                      </a:endParaRPr>
+                    </a:p>
+                  </a:txBody>
+                  <a:tcPr marL="72000" anchor="ctr">
+                    <a:solidFill>
+                      <a:schemeClr val="tx2"/>
+                    </a:solidFill>
+                  </a:tcPr>
+                </a:tc>
+                <a:extLst>
+                  <a:ext uri="{0D108BD9-81ED-4DB2-BD59-A6C34878D82A}">
+                    <a16:rowId xmlns:a16="http://schemas.microsoft.com/office/drawing/2014/main" val="3134875969"/>
+                  </a:ext>
+                </a:extLst>
+              </a:tr>
+              <a:tr h="306020">
+                <a:tc>
+                  <a:txBody>
+                    <a:bodyPr/>
+                    <a:lstStyle/>
+                    <a:p>
+                      <a:pPr algn="ctr" latinLnBrk="1"/>
+                      <a:r>
+                        <a:rPr lang="en-US" altLang="ko-KR" sz="1200" dirty="0"/>
+                        <a:t>CC 01</a:t>
+                      </a:r>
+                      <a:endParaRPr lang="ko-KR" altLang="en-US" sz="1200" dirty="0"/>
+                    </a:p>
+                  </a:txBody>
+                  <a:tcPr marL="72000" anchor="ctr">
+                    <a:solidFill>
+                      <a:schemeClr val="accent1">
+                        <a:lumMod val="50000"/>
+                      </a:schemeClr>
+                    </a:solidFill>
+                  </a:tcPr>
+                </a:tc>
+                <a:tc>
+                  <a:txBody>
+                    <a:bodyPr/>
+                    <a:lstStyle/>
+                    <a:p>
+                      <a:pPr marL="0" marR="0" lvl="0" indent="0" algn="ctr" defTabSz="914400" rtl="0" eaLnBrk="1" fontAlgn="auto" latinLnBrk="1" hangingPunct="1">
+                        <a:lnSpc>
+                          <a:spcPct val="100000"/>
+                        </a:lnSpc>
+                        <a:spcBef>
+                          <a:spcPts val="0"/>
+                        </a:spcBef>
+                        <a:spcAft>
+                          <a:spcPts val="0"/>
+                        </a:spcAft>
+                        <a:buClrTx/>
+                        <a:buSzTx/>
+                        <a:buFontTx/>
+                        <a:buNone/>
+                        <a:tabLst/>
+                        <a:defRPr/>
+                      </a:pPr>
+                      <a:r>
+                        <a:rPr kumimoji="0" lang="en-US" altLang="ko-KR" sz="1200" b="0" i="0" u="none" strike="noStrike" kern="1200" cap="none" spc="0" normalizeH="0" baseline="0" noProof="0" dirty="0" err="1">
+                          <a:ln>
+                            <a:noFill/>
+                          </a:ln>
+                          <a:solidFill>
+                            <a:prstClr val="black"/>
+                          </a:solidFill>
+                          <a:effectLst/>
+                          <a:uLnTx/>
+                          <a:uFillTx/>
+                          <a:latin typeface="+mn-lt"/>
+                          <a:ea typeface="+mn-ea"/>
+                          <a:cs typeface="+mn-cs"/>
+                        </a:rPr>
+                        <a:t>CalendarCalculator.isLunarMonth</a:t>
+                      </a:r>
+                      <a:endParaRPr kumimoji="0" lang="ko-KR" altLang="en-US" sz="1200" b="0" i="0" u="none" strike="noStrike" kern="1200" cap="none" spc="0" normalizeH="0" baseline="0" noProof="0" dirty="0">
+                        <a:ln>
+                          <a:noFill/>
+                        </a:ln>
+                        <a:solidFill>
+                          <a:prstClr val="black"/>
+                        </a:solidFill>
+                        <a:effectLst/>
+                        <a:uLnTx/>
+                        <a:uFillTx/>
+                        <a:latin typeface="+mn-lt"/>
+                        <a:ea typeface="+mn-ea"/>
+                        <a:cs typeface="+mn-cs"/>
+                      </a:endParaRPr>
+                    </a:p>
+                  </a:txBody>
+                  <a:tcPr marL="72000" anchor="ctr"/>
+                </a:tc>
+                <a:tc>
+                  <a:txBody>
+                    <a:bodyPr/>
+                    <a:lstStyle/>
+                    <a:p>
+                      <a:pPr algn="ctr" latinLnBrk="1"/>
+                      <a:r>
+                        <a:rPr lang="ko-KR" altLang="en-US" sz="1200" dirty="0"/>
+                        <a:t>윤년 처리 기능 테스트</a:t>
+                      </a:r>
+                    </a:p>
+                  </a:txBody>
+                  <a:tcPr marL="72000" anchor="ctr"/>
+                </a:tc>
+                <a:tc>
+                  <a:txBody>
+                    <a:bodyPr/>
+                    <a:lstStyle/>
+                    <a:p>
+                      <a:pPr algn="ctr" latinLnBrk="1"/>
+                      <a:r>
+                        <a:rPr lang="en-US" altLang="ko-KR" sz="1200" b="0" dirty="0"/>
+                        <a:t>Pass</a:t>
+                      </a:r>
+                    </a:p>
+                  </a:txBody>
+                  <a:tcPr marL="72000" anchor="ctr"/>
+                </a:tc>
+                <a:extLst>
+                  <a:ext uri="{0D108BD9-81ED-4DB2-BD59-A6C34878D82A}">
+                    <a16:rowId xmlns:a16="http://schemas.microsoft.com/office/drawing/2014/main" val="1719815786"/>
+                  </a:ext>
+                </a:extLst>
+              </a:tr>
+              <a:tr h="306020">
+                <a:tc>
+                  <a:txBody>
+                    <a:bodyPr/>
+                    <a:lstStyle/>
+                    <a:p>
+                      <a:pPr algn="ctr" latinLnBrk="1"/>
+                      <a:r>
+                        <a:rPr lang="en-US" altLang="ko-KR" sz="1200" dirty="0"/>
+                        <a:t>CC 02</a:t>
+                      </a:r>
+                      <a:endParaRPr lang="ko-KR" altLang="en-US" sz="1200" dirty="0"/>
+                    </a:p>
+                  </a:txBody>
+                  <a:tcPr marL="72000" anchor="ctr">
+                    <a:solidFill>
+                      <a:schemeClr val="accent1">
+                        <a:lumMod val="50000"/>
+                      </a:schemeClr>
+                    </a:solidFill>
+                  </a:tcPr>
+                </a:tc>
+                <a:tc>
+                  <a:txBody>
+                    <a:bodyPr/>
+                    <a:lstStyle/>
+                    <a:p>
+                      <a:pPr algn="ctr" latinLnBrk="1"/>
+                      <a:r>
+                        <a:rPr kumimoji="0" lang="en-US" altLang="ko-KR" sz="1200" b="0" i="0" u="none" strike="noStrike" kern="1200" cap="none" spc="0" normalizeH="0" baseline="0" noProof="0" dirty="0" err="1">
+                          <a:ln>
+                            <a:noFill/>
+                          </a:ln>
+                          <a:solidFill>
+                            <a:prstClr val="black"/>
+                          </a:solidFill>
+                          <a:effectLst/>
+                          <a:uLnTx/>
+                          <a:uFillTx/>
+                          <a:latin typeface="+mn-lt"/>
+                          <a:ea typeface="+mn-ea"/>
+                          <a:cs typeface="+mn-cs"/>
+                        </a:rPr>
+                        <a:t>CalendarCalculator.formatDate</a:t>
+                      </a:r>
+                      <a:endParaRPr lang="ko-KR" altLang="en-US" sz="1200" dirty="0"/>
+                    </a:p>
+                  </a:txBody>
+                  <a:tcPr marL="72000" anchor="ctr"/>
+                </a:tc>
+                <a:tc>
+                  <a:txBody>
+                    <a:bodyPr/>
+                    <a:lstStyle/>
+                    <a:p>
+                      <a:pPr algn="ctr" latinLnBrk="1"/>
+                      <a:r>
+                        <a:rPr lang="en-US" altLang="ko-KR" sz="1050" dirty="0"/>
+                        <a:t>“xx-</a:t>
+                      </a:r>
+                      <a:r>
+                        <a:rPr lang="en-US" altLang="ko-KR" sz="1050" dirty="0" err="1"/>
+                        <a:t>yy</a:t>
+                      </a:r>
+                      <a:r>
+                        <a:rPr lang="en-US" altLang="ko-KR" sz="1050" dirty="0"/>
+                        <a:t>-</a:t>
+                      </a:r>
+                      <a:r>
+                        <a:rPr lang="en-US" altLang="ko-KR" sz="1050" dirty="0" err="1"/>
+                        <a:t>zz</a:t>
+                      </a:r>
+                      <a:r>
+                        <a:rPr lang="en-US" altLang="ko-KR" sz="1050" dirty="0"/>
+                        <a:t>” </a:t>
+                      </a:r>
+                      <a:r>
+                        <a:rPr lang="ko-KR" altLang="en-US" sz="1050" dirty="0"/>
+                        <a:t>문자열 </a:t>
+                      </a:r>
+                      <a:r>
+                        <a:rPr lang="en-US" altLang="ko-KR" sz="1050" dirty="0"/>
+                        <a:t>-&gt; (xx,</a:t>
+                      </a:r>
+                      <a:r>
+                        <a:rPr lang="ko-KR" altLang="en-US" sz="1050" dirty="0"/>
+                        <a:t> </a:t>
+                      </a:r>
+                      <a:r>
+                        <a:rPr lang="en-US" altLang="ko-KR" sz="1050" dirty="0" err="1"/>
+                        <a:t>yy</a:t>
+                      </a:r>
+                      <a:r>
+                        <a:rPr lang="en-US" altLang="ko-KR" sz="1050" dirty="0"/>
+                        <a:t>,</a:t>
+                      </a:r>
+                      <a:r>
+                        <a:rPr lang="ko-KR" altLang="en-US" sz="1050" dirty="0"/>
+                        <a:t> </a:t>
+                      </a:r>
+                      <a:r>
+                        <a:rPr lang="en-US" altLang="ko-KR" sz="1050" dirty="0" err="1"/>
+                        <a:t>zz</a:t>
+                      </a:r>
+                      <a:r>
+                        <a:rPr lang="en-US" altLang="ko-KR" sz="1050" dirty="0"/>
+                        <a:t>) Tuple </a:t>
+                      </a:r>
+                      <a:r>
+                        <a:rPr lang="ko-KR" altLang="en-US" sz="1050" dirty="0"/>
+                        <a:t>가공 기능</a:t>
+                      </a:r>
+                    </a:p>
+                  </a:txBody>
+                  <a:tcPr marL="72000" anchor="ctr"/>
+                </a:tc>
+                <a:tc>
+                  <a:txBody>
+                    <a:bodyPr/>
+                    <a:lstStyle/>
+                    <a:p>
+                      <a:pPr marL="0" marR="0" lvl="0" indent="0" algn="ctr" defTabSz="914400" rtl="0" eaLnBrk="1" fontAlgn="auto" latinLnBrk="1" hangingPunct="1">
+                        <a:lnSpc>
+                          <a:spcPct val="100000"/>
+                        </a:lnSpc>
+                        <a:spcBef>
+                          <a:spcPts val="0"/>
+                        </a:spcBef>
+                        <a:spcAft>
+                          <a:spcPts val="0"/>
+                        </a:spcAft>
+                        <a:buClrTx/>
+                        <a:buSzTx/>
+                        <a:buFontTx/>
+                        <a:buNone/>
+                        <a:tabLst/>
+                        <a:defRPr/>
+                      </a:pPr>
+                      <a:r>
+                        <a:rPr lang="en-US" altLang="ko-KR" sz="1100" b="0" dirty="0"/>
+                        <a:t>Pass</a:t>
+                      </a:r>
+                    </a:p>
+                  </a:txBody>
+                  <a:tcPr marL="72000" anchor="ctr"/>
+                </a:tc>
+                <a:extLst>
+                  <a:ext uri="{0D108BD9-81ED-4DB2-BD59-A6C34878D82A}">
+                    <a16:rowId xmlns:a16="http://schemas.microsoft.com/office/drawing/2014/main" val="750086017"/>
+                  </a:ext>
+                </a:extLst>
+              </a:tr>
+              <a:tr h="306020">
+                <a:tc>
+                  <a:txBody>
+                    <a:bodyPr/>
+                    <a:lstStyle/>
+                    <a:p>
+                      <a:pPr algn="ctr" latinLnBrk="1"/>
+                      <a:r>
+                        <a:rPr lang="en-US" altLang="ko-KR" sz="1200" dirty="0"/>
+                        <a:t>CC 04</a:t>
+                      </a:r>
+                      <a:endParaRPr lang="ko-KR" altLang="en-US" sz="1200" dirty="0"/>
+                    </a:p>
+                  </a:txBody>
+                  <a:tcPr marL="72000" anchor="ctr">
+                    <a:solidFill>
+                      <a:schemeClr val="accent1">
+                        <a:lumMod val="50000"/>
+                      </a:schemeClr>
+                    </a:solidFill>
+                  </a:tcPr>
+                </a:tc>
+                <a:tc>
+                  <a:txBody>
+                    <a:bodyPr/>
+                    <a:lstStyle/>
+                    <a:p>
+                      <a:pPr algn="ctr" latinLnBrk="1"/>
+                      <a:r>
+                        <a:rPr kumimoji="0" lang="en-US" altLang="ko-KR" sz="1200" b="0" i="0" u="none" strike="noStrike" kern="1200" cap="none" spc="0" normalizeH="0" baseline="0" noProof="0" dirty="0" err="1">
+                          <a:ln>
+                            <a:noFill/>
+                          </a:ln>
+                          <a:solidFill>
+                            <a:prstClr val="black"/>
+                          </a:solidFill>
+                          <a:effectLst/>
+                          <a:uLnTx/>
+                          <a:uFillTx/>
+                          <a:latin typeface="+mn-lt"/>
+                          <a:ea typeface="+mn-ea"/>
+                          <a:cs typeface="+mn-cs"/>
+                        </a:rPr>
+                        <a:t>CalendarCalculator.toSolarDate</a:t>
+                      </a:r>
+                      <a:endParaRPr lang="ko-KR" altLang="en-US" sz="1200" dirty="0"/>
+                    </a:p>
+                  </a:txBody>
+                  <a:tcPr marL="72000" anchor="ctr"/>
+                </a:tc>
+                <a:tc>
+                  <a:txBody>
+                    <a:bodyPr/>
+                    <a:lstStyle/>
+                    <a:p>
+                      <a:pPr algn="ctr" latinLnBrk="1"/>
+                      <a:r>
+                        <a:rPr lang="ko-KR" altLang="en-US" sz="1200" dirty="0"/>
+                        <a:t>음력 </a:t>
+                      </a:r>
+                      <a:r>
+                        <a:rPr lang="en-US" altLang="ko-KR" sz="1200" dirty="0"/>
+                        <a:t>-&gt; </a:t>
+                      </a:r>
+                      <a:r>
+                        <a:rPr lang="ko-KR" altLang="en-US" sz="1200" dirty="0"/>
+                        <a:t>양력 변환 기능 테스트</a:t>
+                      </a:r>
+                    </a:p>
+                  </a:txBody>
+                  <a:tcPr marL="72000" anchor="ctr"/>
+                </a:tc>
+                <a:tc>
+                  <a:txBody>
+                    <a:bodyPr/>
+                    <a:lstStyle/>
+                    <a:p>
+                      <a:pPr algn="ctr" latinLnBrk="1"/>
+                      <a:r>
+                        <a:rPr lang="en-US" altLang="ko-KR" sz="1100" b="0" dirty="0"/>
+                        <a:t>Pass</a:t>
+                      </a:r>
+                      <a:endParaRPr lang="ko-KR" altLang="en-US" sz="1100" dirty="0"/>
+                    </a:p>
+                  </a:txBody>
+                  <a:tcPr marL="72000" anchor="ctr"/>
+                </a:tc>
+                <a:extLst>
+                  <a:ext uri="{0D108BD9-81ED-4DB2-BD59-A6C34878D82A}">
+                    <a16:rowId xmlns:a16="http://schemas.microsoft.com/office/drawing/2014/main" val="3008624949"/>
+                  </a:ext>
+                </a:extLst>
+              </a:tr>
+              <a:tr h="306020">
+                <a:tc>
+                  <a:txBody>
+                    <a:bodyPr/>
+                    <a:lstStyle/>
+                    <a:p>
+                      <a:pPr algn="ctr" latinLnBrk="1"/>
+                      <a:r>
+                        <a:rPr lang="en-US" altLang="ko-KR" sz="1200" dirty="0"/>
+                        <a:t>CC 05</a:t>
+                      </a:r>
+                      <a:endParaRPr lang="ko-KR" altLang="en-US" sz="1200" dirty="0"/>
+                    </a:p>
+                  </a:txBody>
+                  <a:tcPr marL="72000" anchor="ctr">
+                    <a:solidFill>
+                      <a:schemeClr val="accent1">
+                        <a:lumMod val="50000"/>
+                      </a:schemeClr>
+                    </a:solidFill>
+                  </a:tcPr>
+                </a:tc>
+                <a:tc>
+                  <a:txBody>
+                    <a:bodyPr/>
+                    <a:lstStyle/>
+                    <a:p>
+                      <a:pPr algn="ctr" latinLnBrk="1"/>
+                      <a:r>
+                        <a:rPr kumimoji="0" lang="en-US" altLang="ko-KR" sz="1200" b="0" i="0" u="none" strike="noStrike" kern="1200" cap="none" spc="0" normalizeH="0" baseline="0" noProof="0" dirty="0" err="1">
+                          <a:ln>
+                            <a:noFill/>
+                          </a:ln>
+                          <a:solidFill>
+                            <a:prstClr val="black"/>
+                          </a:solidFill>
+                          <a:effectLst/>
+                          <a:uLnTx/>
+                          <a:uFillTx/>
+                          <a:latin typeface="+mn-lt"/>
+                          <a:ea typeface="+mn-ea"/>
+                          <a:cs typeface="+mn-cs"/>
+                        </a:rPr>
+                        <a:t>CalendarCalculator.toLunarDate</a:t>
+                      </a:r>
+                      <a:endParaRPr lang="ko-KR" altLang="en-US" sz="1200" dirty="0"/>
+                    </a:p>
+                  </a:txBody>
+                  <a:tcPr marL="72000" anchor="ctr"/>
+                </a:tc>
+                <a:tc>
+                  <a:txBody>
+                    <a:bodyPr/>
+                    <a:lstStyle/>
+                    <a:p>
+                      <a:pPr algn="ctr" latinLnBrk="1"/>
+                      <a:r>
+                        <a:rPr lang="ko-KR" altLang="en-US" sz="1200" dirty="0"/>
+                        <a:t>양력 </a:t>
+                      </a:r>
+                      <a:r>
+                        <a:rPr lang="en-US" altLang="ko-KR" sz="1200" dirty="0"/>
+                        <a:t>-&gt; </a:t>
+                      </a:r>
+                      <a:r>
+                        <a:rPr lang="ko-KR" altLang="en-US" sz="1200" dirty="0"/>
+                        <a:t>음력 변환 기능 테스트</a:t>
+                      </a:r>
+                    </a:p>
+                  </a:txBody>
+                  <a:tcPr marL="72000" anchor="ctr"/>
+                </a:tc>
+                <a:tc>
+                  <a:txBody>
+                    <a:bodyPr/>
+                    <a:lstStyle/>
+                    <a:p>
+                      <a:pPr algn="ctr" latinLnBrk="1"/>
+                      <a:r>
+                        <a:rPr lang="en-US" altLang="ko-KR" sz="1100" b="0" dirty="0"/>
+                        <a:t>Pass</a:t>
+                      </a:r>
+                      <a:endParaRPr lang="ko-KR" altLang="en-US" sz="1100" dirty="0"/>
+                    </a:p>
+                  </a:txBody>
+                  <a:tcPr marL="72000" anchor="ctr"/>
+                </a:tc>
+                <a:extLst>
+                  <a:ext uri="{0D108BD9-81ED-4DB2-BD59-A6C34878D82A}">
+                    <a16:rowId xmlns:a16="http://schemas.microsoft.com/office/drawing/2014/main" val="1783107652"/>
+                  </a:ext>
+                </a:extLst>
+              </a:tr>
+              <a:tr h="306020">
+                <a:tc>
+                  <a:txBody>
+                    <a:bodyPr/>
+                    <a:lstStyle/>
+                    <a:p>
+                      <a:pPr algn="ctr" latinLnBrk="1"/>
+                      <a:r>
+                        <a:rPr lang="en-US" altLang="ko-KR" sz="1200" dirty="0"/>
+                        <a:t>CC 06</a:t>
+                      </a:r>
+                      <a:endParaRPr lang="ko-KR" altLang="en-US" sz="1200" dirty="0"/>
+                    </a:p>
+                  </a:txBody>
+                  <a:tcPr marL="72000" anchor="ctr">
+                    <a:solidFill>
+                      <a:schemeClr val="accent1">
+                        <a:lumMod val="50000"/>
+                      </a:schemeClr>
+                    </a:solidFill>
+                  </a:tcPr>
+                </a:tc>
+                <a:tc>
+                  <a:txBody>
+                    <a:bodyPr/>
+                    <a:lstStyle/>
+                    <a:p>
+                      <a:pPr algn="ctr" latinLnBrk="1"/>
+                      <a:r>
+                        <a:rPr kumimoji="0" lang="en-US" altLang="ko-KR" sz="1200" b="0" i="0" u="none" strike="noStrike" kern="1200" cap="none" spc="0" normalizeH="0" baseline="0" noProof="0" dirty="0" err="1">
+                          <a:ln>
+                            <a:noFill/>
+                          </a:ln>
+                          <a:solidFill>
+                            <a:prstClr val="black"/>
+                          </a:solidFill>
+                          <a:effectLst/>
+                          <a:uLnTx/>
+                          <a:uFillTx/>
+                          <a:latin typeface="+mn-lt"/>
+                          <a:ea typeface="+mn-ea"/>
+                          <a:cs typeface="+mn-cs"/>
+                        </a:rPr>
+                        <a:t>CalendarCalculator.getSolarHoliday</a:t>
+                      </a:r>
+                      <a:endParaRPr lang="ko-KR" altLang="en-US" sz="1200" dirty="0"/>
+                    </a:p>
+                  </a:txBody>
+                  <a:tcPr marL="72000" anchor="ctr"/>
+                </a:tc>
+                <a:tc>
+                  <a:txBody>
+                    <a:bodyPr/>
+                    <a:lstStyle/>
+                    <a:p>
+                      <a:pPr algn="ctr" latinLnBrk="1"/>
+                      <a:r>
+                        <a:rPr lang="ko-KR" altLang="en-US" sz="1200" dirty="0"/>
+                        <a:t>음력 휴일 </a:t>
+                      </a:r>
+                      <a:r>
+                        <a:rPr lang="en-US" altLang="ko-KR" sz="1200" dirty="0"/>
+                        <a:t>-&gt; </a:t>
+                      </a:r>
+                      <a:r>
+                        <a:rPr lang="ko-KR" altLang="en-US" sz="1200" dirty="0"/>
+                        <a:t>양력 휴일 변환 기능 테스트</a:t>
+                      </a:r>
+                    </a:p>
+                  </a:txBody>
+                  <a:tcPr marL="72000" anchor="ctr"/>
+                </a:tc>
+                <a:tc>
+                  <a:txBody>
+                    <a:bodyPr/>
+                    <a:lstStyle/>
+                    <a:p>
+                      <a:pPr algn="ctr" latinLnBrk="1"/>
+                      <a:r>
+                        <a:rPr lang="en-US" altLang="ko-KR" sz="1100" b="0" dirty="0"/>
+                        <a:t>Pass</a:t>
+                      </a:r>
+                      <a:endParaRPr lang="ko-KR" altLang="en-US" sz="1100" dirty="0"/>
+                    </a:p>
+                  </a:txBody>
+                  <a:tcPr marL="72000" anchor="ctr"/>
+                </a:tc>
+                <a:extLst>
+                  <a:ext uri="{0D108BD9-81ED-4DB2-BD59-A6C34878D82A}">
+                    <a16:rowId xmlns:a16="http://schemas.microsoft.com/office/drawing/2014/main" val="668470449"/>
+                  </a:ext>
+                </a:extLst>
+              </a:tr>
+              <a:tr h="306020">
+                <a:tc>
+                  <a:txBody>
+                    <a:bodyPr/>
+                    <a:lstStyle/>
+                    <a:p>
+                      <a:pPr algn="ctr" latinLnBrk="1"/>
+                      <a:r>
+                        <a:rPr lang="en-US" altLang="ko-KR" sz="1200" dirty="0"/>
+                        <a:t>CM 01</a:t>
+                      </a:r>
+                      <a:endParaRPr lang="ko-KR" altLang="en-US" sz="1200" dirty="0"/>
+                    </a:p>
+                  </a:txBody>
+                  <a:tcPr marL="72000" anchor="ctr">
+                    <a:solidFill>
+                      <a:schemeClr val="accent1">
+                        <a:lumMod val="50000"/>
+                      </a:schemeClr>
+                    </a:solidFill>
+                  </a:tcPr>
+                </a:tc>
+                <a:tc>
+                  <a:txBody>
+                    <a:bodyPr/>
+                    <a:lstStyle/>
+                    <a:p>
+                      <a:pPr algn="ctr" latinLnBrk="1"/>
+                      <a:r>
+                        <a:rPr kumimoji="0" lang="en-US" altLang="ko-KR" sz="1200" b="0" i="0" u="none" strike="noStrike" kern="1200" cap="none" spc="0" normalizeH="0" baseline="0" noProof="0" dirty="0" err="1">
+                          <a:ln>
+                            <a:noFill/>
+                          </a:ln>
+                          <a:solidFill>
+                            <a:prstClr val="black"/>
+                          </a:solidFill>
+                          <a:effectLst/>
+                          <a:uLnTx/>
+                          <a:uFillTx/>
+                          <a:latin typeface="+mn-lt"/>
+                          <a:ea typeface="+mn-ea"/>
+                          <a:cs typeface="+mn-cs"/>
+                        </a:rPr>
+                        <a:t>MyCalendar.makeCalendar</a:t>
+                      </a:r>
+                      <a:endParaRPr lang="ko-KR" altLang="en-US" sz="1200" dirty="0"/>
+                    </a:p>
+                  </a:txBody>
+                  <a:tcPr marL="72000" anchor="ctr"/>
+                </a:tc>
+                <a:tc>
+                  <a:txBody>
+                    <a:bodyPr/>
+                    <a:lstStyle/>
+                    <a:p>
+                      <a:pPr algn="ctr" latinLnBrk="1"/>
+                      <a:r>
+                        <a:rPr lang="ko-KR" altLang="en-US" sz="1200" dirty="0"/>
+                        <a:t>달력 리스트 제작 기능 테스트</a:t>
+                      </a:r>
+                    </a:p>
+                  </a:txBody>
+                  <a:tcPr marL="72000" anchor="ctr"/>
+                </a:tc>
+                <a:tc>
+                  <a:txBody>
+                    <a:bodyPr/>
+                    <a:lstStyle/>
+                    <a:p>
+                      <a:pPr algn="ctr" latinLnBrk="1"/>
+                      <a:r>
+                        <a:rPr lang="en-US" altLang="ko-KR" sz="1100" b="0" dirty="0"/>
+                        <a:t>Pass</a:t>
+                      </a:r>
+                      <a:endParaRPr lang="ko-KR" altLang="en-US" sz="1100" dirty="0"/>
+                    </a:p>
+                  </a:txBody>
+                  <a:tcPr marL="72000" anchor="ctr"/>
+                </a:tc>
+                <a:extLst>
+                  <a:ext uri="{0D108BD9-81ED-4DB2-BD59-A6C34878D82A}">
+                    <a16:rowId xmlns:a16="http://schemas.microsoft.com/office/drawing/2014/main" val="2458786645"/>
+                  </a:ext>
+                </a:extLst>
+              </a:tr>
+              <a:tr h="306020">
+                <a:tc>
+                  <a:txBody>
+                    <a:bodyPr/>
+                    <a:lstStyle/>
+                    <a:p>
+                      <a:pPr algn="ctr" latinLnBrk="1"/>
+                      <a:r>
+                        <a:rPr lang="en-US" altLang="ko-KR" sz="1200" dirty="0"/>
+                        <a:t>CM 02</a:t>
+                      </a:r>
+                      <a:endParaRPr lang="ko-KR" altLang="en-US" sz="1200" dirty="0"/>
+                    </a:p>
+                  </a:txBody>
+                  <a:tcPr marL="72000" anchor="ctr">
+                    <a:solidFill>
+                      <a:schemeClr val="accent1">
+                        <a:lumMod val="50000"/>
+                      </a:schemeClr>
+                    </a:solidFill>
+                  </a:tcPr>
+                </a:tc>
+                <a:tc>
+                  <a:txBody>
+                    <a:bodyPr/>
+                    <a:lstStyle/>
+                    <a:p>
+                      <a:pPr algn="ctr" latinLnBrk="1"/>
+                      <a:r>
+                        <a:rPr kumimoji="0" lang="en-US" altLang="ko-KR" sz="1200" b="0" i="0" u="none" strike="noStrike" kern="1200" cap="none" spc="0" normalizeH="0" baseline="0" noProof="0" dirty="0" err="1">
+                          <a:ln>
+                            <a:noFill/>
+                          </a:ln>
+                          <a:solidFill>
+                            <a:prstClr val="black"/>
+                          </a:solidFill>
+                          <a:effectLst/>
+                          <a:uLnTx/>
+                          <a:uFillTx/>
+                          <a:latin typeface="+mn-lt"/>
+                          <a:ea typeface="+mn-ea"/>
+                          <a:cs typeface="+mn-cs"/>
+                        </a:rPr>
+                        <a:t>MyCalendar</a:t>
+                      </a:r>
+                      <a:r>
+                        <a:rPr kumimoji="0" lang="en-US" altLang="ko-KR" sz="1200" b="0" i="0" u="none" strike="noStrike" kern="1200" cap="none" spc="0" normalizeH="0" baseline="0" noProof="0" dirty="0">
+                          <a:ln>
+                            <a:noFill/>
+                          </a:ln>
+                          <a:solidFill>
+                            <a:prstClr val="black"/>
+                          </a:solidFill>
+                          <a:effectLst/>
+                          <a:uLnTx/>
+                          <a:uFillTx/>
+                          <a:latin typeface="+mn-lt"/>
+                          <a:ea typeface="+mn-ea"/>
+                          <a:cs typeface="+mn-cs"/>
+                        </a:rPr>
+                        <a:t>.</a:t>
+                      </a:r>
+                      <a:endParaRPr lang="ko-KR" altLang="en-US" sz="1200" dirty="0"/>
+                    </a:p>
+                  </a:txBody>
+                  <a:tcPr marL="72000" anchor="ctr"/>
+                </a:tc>
+                <a:tc>
+                  <a:txBody>
+                    <a:bodyPr/>
+                    <a:lstStyle/>
+                    <a:p>
+                      <a:pPr algn="ctr" latinLnBrk="1"/>
+                      <a:r>
+                        <a:rPr lang="ko-KR" altLang="en-US" sz="1200" dirty="0"/>
+                        <a:t>정방형 달력 리스트 제작 기능 테스트</a:t>
+                      </a:r>
+                    </a:p>
+                  </a:txBody>
+                  <a:tcPr marL="72000" anchor="ctr"/>
+                </a:tc>
+                <a:tc>
+                  <a:txBody>
+                    <a:bodyPr/>
+                    <a:lstStyle/>
+                    <a:p>
+                      <a:pPr algn="ctr" latinLnBrk="1"/>
+                      <a:r>
+                        <a:rPr lang="en-US" altLang="ko-KR" sz="1100" b="0" dirty="0"/>
+                        <a:t>Pass</a:t>
+                      </a:r>
+                      <a:endParaRPr lang="ko-KR" altLang="en-US" sz="1100" dirty="0"/>
+                    </a:p>
+                  </a:txBody>
+                  <a:tcPr marL="72000" anchor="ctr"/>
+                </a:tc>
+                <a:extLst>
+                  <a:ext uri="{0D108BD9-81ED-4DB2-BD59-A6C34878D82A}">
+                    <a16:rowId xmlns:a16="http://schemas.microsoft.com/office/drawing/2014/main" val="2713476165"/>
+                  </a:ext>
+                </a:extLst>
+              </a:tr>
+            </a:tbl>
+          </a:graphicData>
+        </a:graphic>
+      </p:graphicFrame>
+    </p:spTree>
+    <p:extLst>
+      <p:ext uri="{BB962C8B-B14F-4D97-AF65-F5344CB8AC3E}">
+        <p14:creationId xmlns:p14="http://schemas.microsoft.com/office/powerpoint/2010/main" val="3402785950"/>
+      </p:ext>
+    </p:extLst>
+  </p:cSld>
+  <p:clrMapOvr>
+    <a:masterClrMapping/>
+  </p:clrMapOvr>
+</p:sld>
+</file>
+
 <file path=ppt/slides/slide2.xml><?xml version="1.0" encoding="utf-8"?>
 <p:sld xmlns:a="http://schemas.openxmlformats.org/drawingml/2006/main" xmlns:r="http://schemas.openxmlformats.org/officeDocument/2006/relationships" xmlns:p="http://schemas.openxmlformats.org/presentationml/2006/main">
   <p:cSld>

</xml_diff>